<commit_message>
edit figure of small example
</commit_message>
<xml_diff>
--- a/figures/figure-small-example/figure3-horizontal.pptx
+++ b/figures/figure-small-example/figure3-horizontal.pptx
@@ -243,7 +243,7 @@
           <a:p>
             <a:fld id="{36D6B43A-FB72-2B4A-8DB0-B6C23179BADB}" type="datetimeFigureOut">
               <a:rPr lang="en-US" smtClean="0"/>
-              <a:t>5/19/23</a:t>
+              <a:t>5/20/23</a:t>
             </a:fld>
             <a:endParaRPr lang="en-US"/>
           </a:p>
@@ -413,7 +413,7 @@
           <a:p>
             <a:fld id="{36D6B43A-FB72-2B4A-8DB0-B6C23179BADB}" type="datetimeFigureOut">
               <a:rPr lang="en-US" smtClean="0"/>
-              <a:t>5/19/23</a:t>
+              <a:t>5/20/23</a:t>
             </a:fld>
             <a:endParaRPr lang="en-US"/>
           </a:p>
@@ -593,7 +593,7 @@
           <a:p>
             <a:fld id="{36D6B43A-FB72-2B4A-8DB0-B6C23179BADB}" type="datetimeFigureOut">
               <a:rPr lang="en-US" smtClean="0"/>
-              <a:t>5/19/23</a:t>
+              <a:t>5/20/23</a:t>
             </a:fld>
             <a:endParaRPr lang="en-US"/>
           </a:p>
@@ -763,7 +763,7 @@
           <a:p>
             <a:fld id="{36D6B43A-FB72-2B4A-8DB0-B6C23179BADB}" type="datetimeFigureOut">
               <a:rPr lang="en-US" smtClean="0"/>
-              <a:t>5/19/23</a:t>
+              <a:t>5/20/23</a:t>
             </a:fld>
             <a:endParaRPr lang="en-US"/>
           </a:p>
@@ -1009,7 +1009,7 @@
           <a:p>
             <a:fld id="{36D6B43A-FB72-2B4A-8DB0-B6C23179BADB}" type="datetimeFigureOut">
               <a:rPr lang="en-US" smtClean="0"/>
-              <a:t>5/19/23</a:t>
+              <a:t>5/20/23</a:t>
             </a:fld>
             <a:endParaRPr lang="en-US"/>
           </a:p>
@@ -1241,7 +1241,7 @@
           <a:p>
             <a:fld id="{36D6B43A-FB72-2B4A-8DB0-B6C23179BADB}" type="datetimeFigureOut">
               <a:rPr lang="en-US" smtClean="0"/>
-              <a:t>5/19/23</a:t>
+              <a:t>5/20/23</a:t>
             </a:fld>
             <a:endParaRPr lang="en-US"/>
           </a:p>
@@ -1608,7 +1608,7 @@
           <a:p>
             <a:fld id="{36D6B43A-FB72-2B4A-8DB0-B6C23179BADB}" type="datetimeFigureOut">
               <a:rPr lang="en-US" smtClean="0"/>
-              <a:t>5/19/23</a:t>
+              <a:t>5/20/23</a:t>
             </a:fld>
             <a:endParaRPr lang="en-US"/>
           </a:p>
@@ -1726,7 +1726,7 @@
           <a:p>
             <a:fld id="{36D6B43A-FB72-2B4A-8DB0-B6C23179BADB}" type="datetimeFigureOut">
               <a:rPr lang="en-US" smtClean="0"/>
-              <a:t>5/19/23</a:t>
+              <a:t>5/20/23</a:t>
             </a:fld>
             <a:endParaRPr lang="en-US"/>
           </a:p>
@@ -1821,7 +1821,7 @@
           <a:p>
             <a:fld id="{36D6B43A-FB72-2B4A-8DB0-B6C23179BADB}" type="datetimeFigureOut">
               <a:rPr lang="en-US" smtClean="0"/>
-              <a:t>5/19/23</a:t>
+              <a:t>5/20/23</a:t>
             </a:fld>
             <a:endParaRPr lang="en-US"/>
           </a:p>
@@ -2098,7 +2098,7 @@
           <a:p>
             <a:fld id="{36D6B43A-FB72-2B4A-8DB0-B6C23179BADB}" type="datetimeFigureOut">
               <a:rPr lang="en-US" smtClean="0"/>
-              <a:t>5/19/23</a:t>
+              <a:t>5/20/23</a:t>
             </a:fld>
             <a:endParaRPr lang="en-US"/>
           </a:p>
@@ -2355,7 +2355,7 @@
           <a:p>
             <a:fld id="{36D6B43A-FB72-2B4A-8DB0-B6C23179BADB}" type="datetimeFigureOut">
               <a:rPr lang="en-US" smtClean="0"/>
-              <a:t>5/19/23</a:t>
+              <a:t>5/20/23</a:t>
             </a:fld>
             <a:endParaRPr lang="en-US"/>
           </a:p>
@@ -2568,7 +2568,7 @@
           <a:p>
             <a:fld id="{36D6B43A-FB72-2B4A-8DB0-B6C23179BADB}" type="datetimeFigureOut">
               <a:rPr lang="en-US" smtClean="0"/>
-              <a:t>5/19/23</a:t>
+              <a:t>5/20/23</a:t>
             </a:fld>
             <a:endParaRPr lang="en-US"/>
           </a:p>
@@ -3000,8 +3000,8 @@
         </p:blipFill>
         <p:spPr>
           <a:xfrm>
-            <a:off x="3779329" y="2336176"/>
-            <a:ext cx="3060240" cy="1861201"/>
+            <a:off x="3733776" y="2369306"/>
+            <a:ext cx="3105793" cy="1861201"/>
           </a:xfrm>
           <a:prstGeom prst="rect">
             <a:avLst/>
@@ -3059,7 +3059,7 @@
         </p:nvGrpSpPr>
         <p:grpSpPr>
           <a:xfrm>
-            <a:off x="1431948" y="3664915"/>
+            <a:off x="1451826" y="3724549"/>
             <a:ext cx="1114444" cy="675655"/>
             <a:chOff x="-642934" y="6912114"/>
             <a:chExt cx="3881748" cy="2353391"/>
@@ -3192,7 +3192,7 @@
         </p:nvGrpSpPr>
         <p:grpSpPr>
           <a:xfrm>
-            <a:off x="1429744" y="901025"/>
+            <a:off x="1429744" y="1026919"/>
             <a:ext cx="1118853" cy="679201"/>
             <a:chOff x="-630085" y="31680"/>
             <a:chExt cx="3906218" cy="2371273"/>
@@ -3346,7 +3346,7 @@
         </p:nvGrpSpPr>
         <p:grpSpPr>
           <a:xfrm>
-            <a:off x="1385190" y="2944848"/>
+            <a:off x="1391816" y="3017734"/>
             <a:ext cx="1207961" cy="675655"/>
             <a:chOff x="6303322" y="671399"/>
             <a:chExt cx="3885282" cy="2173176"/>
@@ -3506,7 +3506,7 @@
         </p:nvGrpSpPr>
         <p:grpSpPr>
           <a:xfrm>
-            <a:off x="2427291" y="868132"/>
+            <a:off x="2447169" y="1172928"/>
             <a:ext cx="1216665" cy="667181"/>
             <a:chOff x="7039380" y="4970127"/>
             <a:chExt cx="3046169" cy="1670423"/>
@@ -3711,7 +3711,7 @@
         </p:nvGrpSpPr>
         <p:grpSpPr>
           <a:xfrm>
-            <a:off x="2500988" y="1609020"/>
+            <a:off x="2520866" y="1913816"/>
             <a:ext cx="1097623" cy="613626"/>
             <a:chOff x="9722964" y="5069049"/>
             <a:chExt cx="2748123" cy="1536338"/>
@@ -3916,7 +3916,7 @@
         </p:nvGrpSpPr>
         <p:grpSpPr>
           <a:xfrm>
-            <a:off x="1397647" y="2237464"/>
+            <a:off x="1397647" y="2330228"/>
             <a:ext cx="1183046" cy="661645"/>
             <a:chOff x="12064664" y="1579761"/>
             <a:chExt cx="2961997" cy="1656564"/>
@@ -4102,7 +4102,7 @@
         </p:nvGrpSpPr>
         <p:grpSpPr>
           <a:xfrm>
-            <a:off x="2504728" y="2983739"/>
+            <a:off x="2524606" y="3288535"/>
             <a:ext cx="1090136" cy="606266"/>
             <a:chOff x="12263291" y="5079733"/>
             <a:chExt cx="2729378" cy="1517910"/>
@@ -4286,7 +4286,7 @@
         </p:nvGrpSpPr>
         <p:grpSpPr>
           <a:xfrm>
-            <a:off x="1438295" y="1570669"/>
+            <a:off x="1438295" y="1683311"/>
             <a:ext cx="1087575" cy="608408"/>
             <a:chOff x="9656734" y="1647008"/>
             <a:chExt cx="2722964" cy="1523273"/>
@@ -4493,7 +4493,7 @@
         </p:nvGrpSpPr>
         <p:grpSpPr>
           <a:xfrm>
-            <a:off x="2503988" y="2296358"/>
+            <a:off x="2523866" y="2601154"/>
             <a:ext cx="1091616" cy="613675"/>
             <a:chOff x="12301284" y="3375068"/>
             <a:chExt cx="2733084" cy="1536459"/>
@@ -4698,8 +4698,8 @@
         </p:nvSpPr>
         <p:spPr>
           <a:xfrm>
-            <a:off x="24560" y="438699"/>
-            <a:ext cx="1416348" cy="292388"/>
+            <a:off x="27111" y="464797"/>
+            <a:ext cx="1447237" cy="415498"/>
           </a:xfrm>
           <a:prstGeom prst="rect">
             <a:avLst/>
@@ -4713,12 +4713,12 @@
           <a:lstStyle/>
           <a:p>
             <a:r>
-              <a:rPr lang="en-US" sz="650" b="1" dirty="0"/>
+              <a:rPr lang="en-US" sz="700" b="1" dirty="0"/>
               <a:t>a1)</a:t>
             </a:r>
             <a:r>
-              <a:rPr lang="en-US" sz="650" dirty="0"/>
-              <a:t> Assemble a list of species names. This is a list of 6 bird species:</a:t>
+              <a:rPr lang="en-US" sz="700" dirty="0"/>
+              <a:t> Assembled a list of species names. This is the list of 6 bird species:</a:t>
             </a:r>
           </a:p>
         </p:txBody>
@@ -4737,8 +4737,8 @@
         </p:nvSpPr>
         <p:spPr>
           <a:xfrm>
-            <a:off x="7843" y="1765541"/>
-            <a:ext cx="1402435" cy="592470"/>
+            <a:off x="7843" y="1917939"/>
+            <a:ext cx="1402435" cy="738664"/>
           </a:xfrm>
           <a:prstGeom prst="rect">
             <a:avLst/>
@@ -4752,38 +4752,38 @@
           <a:lstStyle/>
           <a:p>
             <a:r>
-              <a:rPr lang="en-US" sz="650" b="1" dirty="0"/>
+              <a:rPr lang="en-US" sz="700" b="1" dirty="0"/>
               <a:t>a2)</a:t>
             </a:r>
             <a:r>
-              <a:rPr lang="en-US" sz="650" dirty="0"/>
-              <a:t> Process species names with </a:t>
-            </a:r>
-            <a:r>
-              <a:rPr lang="en-US" sz="650" b="1" dirty="0"/>
+              <a:rPr lang="en-US" sz="700" dirty="0"/>
+              <a:t> Processed species names with </a:t>
+            </a:r>
+            <a:r>
+              <a:rPr lang="en-US" sz="700" b="1" dirty="0"/>
               <a:t>TNRS</a:t>
             </a:r>
             <a:r>
-              <a:rPr lang="en-US" sz="650" dirty="0"/>
+              <a:rPr lang="en-US" sz="700" dirty="0"/>
               <a:t> and </a:t>
             </a:r>
             <a:r>
-              <a:rPr lang="en-US" sz="650" b="1" dirty="0"/>
-              <a:t>standardize</a:t>
-            </a:r>
-            <a:r>
-              <a:rPr lang="en-US" sz="650" dirty="0"/>
+              <a:rPr lang="en-US" sz="700" b="1" dirty="0"/>
+              <a:t>standardized</a:t>
+            </a:r>
+            <a:r>
+              <a:rPr lang="en-US" sz="700" dirty="0"/>
               <a:t> to the </a:t>
             </a:r>
             <a:r>
-              <a:rPr lang="en-US" sz="650" dirty="0" err="1"/>
+              <a:rPr lang="en-US" sz="700" dirty="0" err="1"/>
               <a:t>OpenTree</a:t>
             </a:r>
             <a:r>
-              <a:rPr lang="en-US" sz="650" dirty="0"/>
-              <a:t> taxonomy. One species  name  (bold) is a synonym in the standardized taxonomy.</a:t>
-            </a:r>
-            <a:endParaRPr lang="en-US" sz="650" i="1" dirty="0"/>
+              <a:rPr lang="en-US" sz="700" dirty="0"/>
+              <a:t> taxonomy v3.3draft1. One species  name  (bold) is a synonym in the standardized taxonomy.</a:t>
+            </a:r>
+            <a:endParaRPr lang="en-US" sz="700" i="1" dirty="0"/>
           </a:p>
         </p:txBody>
       </p:sp>
@@ -4801,8 +4801,8 @@
         </p:nvSpPr>
         <p:spPr>
           <a:xfrm rot="5400000" flipV="1">
-            <a:off x="-326164" y="1193353"/>
-            <a:ext cx="1036439" cy="101141"/>
+            <a:off x="-311217" y="1350682"/>
+            <a:ext cx="1015836" cy="110432"/>
           </a:xfrm>
           <a:prstGeom prst="rightArrow">
             <a:avLst/>
@@ -4864,7 +4864,7 @@
         <p:spPr>
           <a:xfrm>
             <a:off x="3786383" y="394293"/>
-            <a:ext cx="3018791" cy="192360"/>
+            <a:ext cx="3071617" cy="200055"/>
           </a:xfrm>
           <a:prstGeom prst="rect">
             <a:avLst/>
@@ -4878,36 +4878,28 @@
           <a:lstStyle/>
           <a:p>
             <a:r>
-              <a:rPr lang="en-US" sz="650" b="1" dirty="0"/>
+              <a:rPr lang="en-US" sz="700" b="1" dirty="0"/>
               <a:t>c1)</a:t>
             </a:r>
             <a:r>
-              <a:rPr lang="en-US" sz="650" dirty="0"/>
+              <a:rPr lang="en-US" sz="700" dirty="0"/>
               <a:t> Chose a </a:t>
             </a:r>
             <a:r>
-              <a:rPr lang="en-US" sz="650" b="1" dirty="0"/>
-              <a:t>tree topology. </a:t>
-            </a:r>
-            <a:r>
-              <a:rPr lang="en-US" sz="650" dirty="0"/>
-              <a:t>We extracted one</a:t>
-            </a:r>
-            <a:r>
-              <a:rPr lang="en-US" sz="650" b="1" dirty="0"/>
-              <a:t> </a:t>
-            </a:r>
-            <a:r>
-              <a:rPr lang="en-US" sz="650" dirty="0"/>
+              <a:rPr lang="en-US" sz="700" b="1" dirty="0"/>
+              <a:t>tree topology </a:t>
+            </a:r>
+            <a:r>
+              <a:rPr lang="en-US" sz="700" dirty="0"/>
               <a:t>from </a:t>
             </a:r>
             <a:r>
-              <a:rPr lang="en-US" sz="650" dirty="0" err="1"/>
+              <a:rPr lang="en-US" sz="700" dirty="0" err="1"/>
               <a:t>OpenTree’s</a:t>
             </a:r>
             <a:r>
-              <a:rPr lang="en-US" sz="650" dirty="0"/>
-              <a:t> synthetic phylogeny.</a:t>
+              <a:rPr lang="en-US" sz="700" dirty="0"/>
+              <a:t> synthetic phylogeny v13.4.</a:t>
             </a:r>
           </a:p>
         </p:txBody>
@@ -4926,8 +4918,8 @@
         </p:nvSpPr>
         <p:spPr>
           <a:xfrm>
-            <a:off x="3763926" y="727580"/>
-            <a:ext cx="1197933" cy="392415"/>
+            <a:off x="3763926" y="701076"/>
+            <a:ext cx="1197933" cy="523220"/>
           </a:xfrm>
           <a:prstGeom prst="rect">
             <a:avLst/>
@@ -4941,20 +4933,24 @@
           <a:lstStyle/>
           <a:p>
             <a:r>
-              <a:rPr lang="en-US" sz="650" b="1" dirty="0"/>
+              <a:rPr lang="en-US" sz="700" b="1" dirty="0"/>
               <a:t>c2)</a:t>
             </a:r>
             <a:r>
-              <a:rPr lang="en-US" sz="650" dirty="0"/>
+              <a:rPr lang="en-US" sz="700" dirty="0"/>
               <a:t> </a:t>
             </a:r>
             <a:r>
-              <a:rPr lang="en-US" sz="650" b="1" dirty="0" err="1"/>
-              <a:t>Congruify</a:t>
-            </a:r>
-            <a:r>
-              <a:rPr lang="en-US" sz="650" dirty="0"/>
-              <a:t> source chronogram nodes to nodes of tree topology. See Table 1.</a:t>
+              <a:rPr lang="en-US" sz="700" b="1" dirty="0" err="1"/>
+              <a:t>Congruified</a:t>
+            </a:r>
+            <a:r>
+              <a:rPr lang="en-US" sz="700" b="1" dirty="0"/>
+              <a:t> </a:t>
+            </a:r>
+            <a:r>
+              <a:rPr lang="en-US" sz="700" dirty="0"/>
+              <a:t>source chronogram nodes to nodes of tree topology. See Table 1.</a:t>
             </a:r>
           </a:p>
         </p:txBody>
@@ -4974,7 +4970,7 @@
         <p:spPr>
           <a:xfrm>
             <a:off x="1516959" y="386450"/>
-            <a:ext cx="1068596" cy="492443"/>
+            <a:ext cx="1068596" cy="630942"/>
           </a:xfrm>
           <a:prstGeom prst="rect">
             <a:avLst/>
@@ -4988,19 +4984,19 @@
           <a:lstStyle/>
           <a:p>
             <a:r>
-              <a:rPr lang="en-US" sz="650" b="1" dirty="0"/>
+              <a:rPr lang="en-US" sz="700" b="1" dirty="0"/>
               <a:t>b1)</a:t>
             </a:r>
             <a:r>
-              <a:rPr lang="en-US" sz="650" dirty="0"/>
-              <a:t> Searched processed taxon names across 253 chronogram in </a:t>
-            </a:r>
-            <a:r>
-              <a:rPr lang="en-US" sz="650" dirty="0" err="1"/>
+              <a:rPr lang="en-US" sz="700" dirty="0"/>
+              <a:t> Searched processed taxon names across 253 chronograms in </a:t>
+            </a:r>
+            <a:r>
+              <a:rPr lang="en-US" sz="700" b="1" dirty="0" err="1"/>
               <a:t>DateLife’s</a:t>
             </a:r>
             <a:r>
-              <a:rPr lang="en-US" sz="650" dirty="0"/>
+              <a:rPr lang="en-US" sz="700" b="1" dirty="0"/>
               <a:t> database v0.6.2</a:t>
             </a:r>
           </a:p>
@@ -5126,7 +5122,7 @@
         <p:spPr>
           <a:xfrm>
             <a:off x="2674309" y="392675"/>
-            <a:ext cx="1039269" cy="492443"/>
+            <a:ext cx="1039269" cy="523220"/>
           </a:xfrm>
           <a:prstGeom prst="rect">
             <a:avLst/>
@@ -5140,12 +5136,20 @@
           <a:lstStyle/>
           <a:p>
             <a:r>
-              <a:rPr lang="en-US" sz="650" b="1" dirty="0"/>
+              <a:rPr lang="en-US" sz="700" b="1" dirty="0"/>
               <a:t>b2)</a:t>
             </a:r>
             <a:r>
-              <a:rPr lang="en-US" sz="650" dirty="0"/>
-              <a:t> Search resulted in 9 source chronograms from 6 independent, published studies.</a:t>
+              <a:rPr lang="en-US" sz="700" dirty="0"/>
+              <a:t> Search resulted in</a:t>
+            </a:r>
+            <a:r>
+              <a:rPr lang="en-US" sz="700" b="1" dirty="0"/>
+              <a:t> 9 source chronograms </a:t>
+            </a:r>
+            <a:r>
+              <a:rPr lang="en-US" sz="700" dirty="0"/>
+              <a:t>from 6 independent, published studies:</a:t>
             </a:r>
           </a:p>
         </p:txBody>
@@ -5164,8 +5168,8 @@
         </p:nvSpPr>
         <p:spPr>
           <a:xfrm>
-            <a:off x="3795744" y="1620548"/>
-            <a:ext cx="1074941" cy="492443"/>
+            <a:off x="3795744" y="1806076"/>
+            <a:ext cx="1074941" cy="523220"/>
           </a:xfrm>
           <a:prstGeom prst="rect">
             <a:avLst/>
@@ -5179,23 +5183,23 @@
           <a:lstStyle/>
           <a:p>
             <a:r>
-              <a:rPr lang="en-US" sz="650" b="1" dirty="0"/>
+              <a:rPr lang="en-US" sz="700" b="1" dirty="0"/>
               <a:t>c4)</a:t>
             </a:r>
             <a:r>
-              <a:rPr lang="en-US" sz="650" dirty="0"/>
-              <a:t> Use summarized ages of congruent nodes to </a:t>
-            </a:r>
-            <a:r>
-              <a:rPr lang="en-US" sz="650" b="1" dirty="0"/>
+              <a:rPr lang="en-US" sz="700" dirty="0"/>
+              <a:t> Used summarized ages of congruent nodes to </a:t>
+            </a:r>
+            <a:r>
+              <a:rPr lang="en-US" sz="700" b="1" dirty="0"/>
               <a:t>date the chosen tree topology </a:t>
             </a:r>
             <a:r>
-              <a:rPr lang="en-US" sz="650" dirty="0"/>
+              <a:rPr lang="en-US" sz="700" dirty="0"/>
               <a:t>with BLADJ</a:t>
             </a:r>
             <a:r>
-              <a:rPr lang="en-US" sz="650" b="1" dirty="0"/>
+              <a:rPr lang="en-US" sz="700" b="1" dirty="0"/>
               <a:t>.</a:t>
             </a:r>
           </a:p>
@@ -5215,8 +5219,8 @@
         </p:nvSpPr>
         <p:spPr>
           <a:xfrm>
-            <a:off x="3786383" y="1215512"/>
-            <a:ext cx="959727" cy="292388"/>
+            <a:off x="3786383" y="1354658"/>
+            <a:ext cx="1048710" cy="307777"/>
           </a:xfrm>
           <a:prstGeom prst="rect">
             <a:avLst/>
@@ -5230,19 +5234,19 @@
           <a:lstStyle/>
           <a:p>
             <a:r>
-              <a:rPr lang="en-US" sz="650" b="1" dirty="0"/>
+              <a:rPr lang="en-US" sz="700" b="1" dirty="0"/>
               <a:t>c3)</a:t>
             </a:r>
             <a:r>
-              <a:rPr lang="en-US" sz="650" dirty="0"/>
+              <a:rPr lang="en-US" sz="700" dirty="0"/>
               <a:t> </a:t>
             </a:r>
             <a:r>
-              <a:rPr lang="en-US" sz="650" b="1" dirty="0"/>
-              <a:t>Summarize</a:t>
-            </a:r>
-            <a:r>
-              <a:rPr lang="en-US" sz="650" dirty="0"/>
+              <a:rPr lang="en-US" sz="700" b="1" dirty="0"/>
+              <a:t>Summarized</a:t>
+            </a:r>
+            <a:r>
+              <a:rPr lang="en-US" sz="700" dirty="0"/>
               <a:t> ages per node. See Table 2.</a:t>
             </a:r>
           </a:p>
@@ -5302,7 +5306,7 @@
         </p:nvSpPr>
         <p:spPr>
           <a:xfrm>
-            <a:off x="82520" y="818057"/>
+            <a:off x="94968" y="945172"/>
             <a:ext cx="1358064" cy="830997"/>
           </a:xfrm>
           <a:prstGeom prst="rect">
@@ -5541,7 +5545,7 @@
         </p:nvSpPr>
         <p:spPr>
           <a:xfrm>
-            <a:off x="3800008" y="2232428"/>
+            <a:off x="4403310" y="2271761"/>
             <a:ext cx="1836341" cy="239937"/>
           </a:xfrm>
           <a:prstGeom prst="rect">
@@ -5577,7 +5581,7 @@
         </p:nvSpPr>
         <p:spPr>
           <a:xfrm flipV="1">
-            <a:off x="2502235" y="521142"/>
+            <a:off x="2522113" y="454882"/>
             <a:ext cx="190833" cy="111591"/>
           </a:xfrm>
           <a:prstGeom prst="rightArrow">
@@ -5701,7 +5705,7 @@
         </p:nvSpPr>
         <p:spPr>
           <a:xfrm rot="5400000" flipV="1">
-            <a:off x="4016737" y="1117728"/>
+            <a:off x="4016737" y="1236996"/>
             <a:ext cx="192024" cy="109728"/>
           </a:xfrm>
           <a:prstGeom prst="rightArrow">
@@ -5763,7 +5767,7 @@
         </p:nvSpPr>
         <p:spPr>
           <a:xfrm rot="5400000" flipV="1">
-            <a:off x="4016737" y="1510900"/>
+            <a:off x="4016737" y="1696428"/>
             <a:ext cx="192024" cy="109728"/>
           </a:xfrm>
           <a:prstGeom prst="rightArrow">
@@ -5825,7 +5829,7 @@
         </p:nvSpPr>
         <p:spPr>
           <a:xfrm rot="5400000" flipV="1">
-            <a:off x="4016737" y="2130056"/>
+            <a:off x="4016737" y="2342088"/>
             <a:ext cx="192024" cy="109728"/>
           </a:xfrm>
           <a:prstGeom prst="rightArrow">
@@ -5900,7 +5904,7 @@
         </p:blipFill>
         <p:spPr>
           <a:xfrm>
-            <a:off x="3779329" y="4093539"/>
+            <a:off x="3779329" y="4126669"/>
             <a:ext cx="3060240" cy="265031"/>
           </a:xfrm>
           <a:prstGeom prst="rect">
@@ -6197,7 +6201,7 @@
         <p:grpSpPr>
           <a:xfrm>
             <a:off x="35157" y="24820"/>
-            <a:ext cx="1375964" cy="3237592"/>
+            <a:ext cx="1375964" cy="3638914"/>
             <a:chOff x="412729" y="5797035"/>
             <a:chExt cx="2538828" cy="1510990"/>
           </a:xfrm>
@@ -6274,7 +6278,7 @@
           <p:spPr>
             <a:xfrm>
               <a:off x="412729" y="5797035"/>
-              <a:ext cx="2527112" cy="186701"/>
+              <a:ext cx="2527111" cy="160118"/>
             </a:xfrm>
             <a:prstGeom prst="roundRect">
               <a:avLst/>
@@ -6333,7 +6337,7 @@
         </p:nvSpPr>
         <p:spPr>
           <a:xfrm>
-            <a:off x="3813723" y="83168"/>
+            <a:off x="3813723" y="89136"/>
             <a:ext cx="2991452" cy="239937"/>
           </a:xfrm>
           <a:prstGeom prst="rect">
@@ -6421,7 +6425,7 @@
         </p:nvSpPr>
         <p:spPr>
           <a:xfrm>
-            <a:off x="38618" y="14211"/>
+            <a:off x="38618" y="15333"/>
             <a:ext cx="1345427" cy="387542"/>
           </a:xfrm>
           <a:prstGeom prst="rect">
@@ -6465,7 +6469,7 @@
         </p:nvSpPr>
         <p:spPr>
           <a:xfrm>
-            <a:off x="102142" y="2341302"/>
+            <a:off x="102142" y="2705732"/>
             <a:ext cx="1348446" cy="830997"/>
           </a:xfrm>
           <a:prstGeom prst="rect">

</xml_diff>

<commit_message>
add summary table to workflow figure and make it horizontal
</commit_message>
<xml_diff>
--- a/figures/figure-small-example/figure3-horizontal.pptx
+++ b/figures/figure-small-example/figure3-horizontal.pptx
@@ -2973,41 +2973,97 @@
           <a:chExt cx="0" cy="0"/>
         </a:xfrm>
       </p:grpSpPr>
-      <p:pic>
-        <p:nvPicPr>
-          <p:cNvPr id="116" name="Graphic 115">
+      <p:grpSp>
+        <p:nvGrpSpPr>
+          <p:cNvPr id="13" name="Group 12">
             <a:extLst>
               <a:ext uri="{FF2B5EF4-FFF2-40B4-BE49-F238E27FC236}">
-                <a16:creationId xmlns:a16="http://schemas.microsoft.com/office/drawing/2014/main" id="{6ACC12CA-6D7B-D698-744F-12AFBA5B722C}"/>
+                <a16:creationId xmlns:a16="http://schemas.microsoft.com/office/drawing/2014/main" id="{D80BA30C-281F-0763-77E3-620DAD36A0B9}"/>
               </a:ext>
             </a:extLst>
           </p:cNvPr>
-          <p:cNvPicPr>
-            <a:picLocks noChangeAspect="1"/>
-          </p:cNvPicPr>
+          <p:cNvGrpSpPr/>
           <p:nvPr/>
-        </p:nvPicPr>
-        <p:blipFill rotWithShape="1">
-          <a:blip r:embed="rId2">
-            <a:extLst>
-              <a:ext uri="{96DAC541-7B7A-43D3-8B79-37D633B846F1}">
-                <asvg:svgBlip xmlns:asvg="http://schemas.microsoft.com/office/drawing/2016/SVG/main" r:embed="rId3"/>
-              </a:ext>
-            </a:extLst>
-          </a:blip>
-          <a:srcRect t="5404" b="20228"/>
-          <a:stretch/>
-        </p:blipFill>
-        <p:spPr>
+        </p:nvGrpSpPr>
+        <p:grpSpPr>
           <a:xfrm>
-            <a:off x="3733776" y="2369306"/>
-            <a:ext cx="3105793" cy="1861201"/>
+            <a:off x="3720524" y="2382558"/>
+            <a:ext cx="3105793" cy="2009142"/>
+            <a:chOff x="3720524" y="2382558"/>
+            <a:chExt cx="3105793" cy="2009142"/>
           </a:xfrm>
-          <a:prstGeom prst="rect">
-            <a:avLst/>
-          </a:prstGeom>
-        </p:spPr>
-      </p:pic>
+        </p:grpSpPr>
+        <p:pic>
+          <p:nvPicPr>
+            <p:cNvPr id="116" name="Graphic 115">
+              <a:extLst>
+                <a:ext uri="{FF2B5EF4-FFF2-40B4-BE49-F238E27FC236}">
+                  <a16:creationId xmlns:a16="http://schemas.microsoft.com/office/drawing/2014/main" id="{6ACC12CA-6D7B-D698-744F-12AFBA5B722C}"/>
+                </a:ext>
+              </a:extLst>
+            </p:cNvPr>
+            <p:cNvPicPr>
+              <a:picLocks noChangeAspect="1"/>
+            </p:cNvPicPr>
+            <p:nvPr/>
+          </p:nvPicPr>
+          <p:blipFill rotWithShape="1">
+            <a:blip r:embed="rId2">
+              <a:extLst>
+                <a:ext uri="{96DAC541-7B7A-43D3-8B79-37D633B846F1}">
+                  <asvg:svgBlip xmlns:asvg="http://schemas.microsoft.com/office/drawing/2016/SVG/main" r:embed="rId3"/>
+                </a:ext>
+              </a:extLst>
+            </a:blip>
+            <a:srcRect t="5404" b="20228"/>
+            <a:stretch/>
+          </p:blipFill>
+          <p:spPr>
+            <a:xfrm>
+              <a:off x="3720524" y="2382558"/>
+              <a:ext cx="3105793" cy="1861201"/>
+            </a:xfrm>
+            <a:prstGeom prst="rect">
+              <a:avLst/>
+            </a:prstGeom>
+          </p:spPr>
+        </p:pic>
+        <p:pic>
+          <p:nvPicPr>
+            <p:cNvPr id="38" name="Graphic 37">
+              <a:extLst>
+                <a:ext uri="{FF2B5EF4-FFF2-40B4-BE49-F238E27FC236}">
+                  <a16:creationId xmlns:a16="http://schemas.microsoft.com/office/drawing/2014/main" id="{AFB2187E-B8E0-BF02-B0EA-55CD4CC7870F}"/>
+                </a:ext>
+              </a:extLst>
+            </p:cNvPr>
+            <p:cNvPicPr>
+              <a:picLocks noChangeAspect="1"/>
+            </p:cNvPicPr>
+            <p:nvPr/>
+          </p:nvPicPr>
+          <p:blipFill rotWithShape="1">
+            <a:blip r:embed="rId2">
+              <a:extLst>
+                <a:ext uri="{96DAC541-7B7A-43D3-8B79-37D633B846F1}">
+                  <asvg:svgBlip xmlns:asvg="http://schemas.microsoft.com/office/drawing/2016/SVG/main" r:embed="rId3"/>
+                </a:ext>
+              </a:extLst>
+            </a:blip>
+            <a:srcRect t="87332" r="31443" b="4995"/>
+            <a:stretch/>
+          </p:blipFill>
+          <p:spPr>
+            <a:xfrm>
+              <a:off x="3746199" y="4199676"/>
+              <a:ext cx="2098010" cy="192024"/>
+            </a:xfrm>
+            <a:prstGeom prst="rect">
+              <a:avLst/>
+            </a:prstGeom>
+          </p:spPr>
+        </p:pic>
+      </p:grpSp>
       <p:pic>
         <p:nvPicPr>
           <p:cNvPr id="110" name="Graphic 109">
@@ -4698,7 +4754,7 @@
         </p:nvSpPr>
         <p:spPr>
           <a:xfrm>
-            <a:off x="27111" y="464797"/>
+            <a:off x="27111" y="451545"/>
             <a:ext cx="1447237" cy="415498"/>
           </a:xfrm>
           <a:prstGeom prst="rect">
@@ -4737,7 +4793,7 @@
         </p:nvSpPr>
         <p:spPr>
           <a:xfrm>
-            <a:off x="7843" y="1917939"/>
+            <a:off x="22273" y="2170014"/>
             <a:ext cx="1402435" cy="738664"/>
           </a:xfrm>
           <a:prstGeom prst="rect">
@@ -4801,8 +4857,8 @@
         </p:nvSpPr>
         <p:spPr>
           <a:xfrm rot="5400000" flipV="1">
-            <a:off x="-311217" y="1350682"/>
-            <a:ext cx="1015836" cy="110432"/>
+            <a:off x="-414589" y="1427550"/>
+            <a:ext cx="1185804" cy="126664"/>
           </a:xfrm>
           <a:prstGeom prst="rightArrow">
             <a:avLst/>
@@ -4919,7 +4975,7 @@
         <p:spPr>
           <a:xfrm>
             <a:off x="3763926" y="701076"/>
-            <a:ext cx="1197933" cy="523220"/>
+            <a:ext cx="1278526" cy="523220"/>
           </a:xfrm>
           <a:prstGeom prst="rect">
             <a:avLst/>
@@ -4950,7 +5006,13 @@
             </a:r>
             <a:r>
               <a:rPr lang="en-US" sz="700" dirty="0"/>
-              <a:t>source chronogram nodes to nodes of tree topology. See Table 1.</a:t>
+              <a:t>source chronogram nodes to nodes of tree topology. </a:t>
+            </a:r>
+          </a:p>
+          <a:p>
+            <a:r>
+              <a:rPr lang="en-US" sz="700" dirty="0"/>
+              <a:t>See Table 1.</a:t>
             </a:r>
           </a:p>
         </p:txBody>
@@ -5016,7 +5078,7 @@
         </p:nvGrpSpPr>
         <p:grpSpPr>
           <a:xfrm>
-            <a:off x="4786444" y="615517"/>
+            <a:off x="4984139" y="619504"/>
             <a:ext cx="519451" cy="310176"/>
             <a:chOff x="8180912" y="11275546"/>
             <a:chExt cx="2375842" cy="1418668"/>
@@ -5168,8 +5230,8 @@
         </p:nvSpPr>
         <p:spPr>
           <a:xfrm>
-            <a:off x="3795744" y="1806076"/>
-            <a:ext cx="1074941" cy="523220"/>
+            <a:off x="3746199" y="1923415"/>
+            <a:ext cx="1426872" cy="415498"/>
           </a:xfrm>
           <a:prstGeom prst="rect">
             <a:avLst/>
@@ -5219,8 +5281,8 @@
         </p:nvSpPr>
         <p:spPr>
           <a:xfrm>
-            <a:off x="3786383" y="1354658"/>
-            <a:ext cx="1048710" cy="307777"/>
+            <a:off x="3734085" y="1354976"/>
+            <a:ext cx="1101007" cy="415498"/>
           </a:xfrm>
           <a:prstGeom prst="rect">
             <a:avLst/>
@@ -5243,7 +5305,11 @@
             </a:r>
             <a:r>
               <a:rPr lang="en-US" sz="700" b="1" dirty="0"/>
-              <a:t>Summarized</a:t>
+              <a:t>Get summarized </a:t>
+            </a:r>
+            <a:r>
+              <a:rPr lang="en-US" sz="700" b="1" dirty="0" err="1"/>
+              <a:t>congruified</a:t>
             </a:r>
             <a:r>
               <a:rPr lang="en-US" sz="700" dirty="0"/>
@@ -5266,8 +5332,8 @@
         </p:nvSpPr>
         <p:spPr>
           <a:xfrm>
-            <a:off x="4835093" y="654386"/>
-            <a:ext cx="2043944" cy="215444"/>
+            <a:off x="5042452" y="641639"/>
+            <a:ext cx="2043944" cy="230832"/>
           </a:xfrm>
           <a:prstGeom prst="rect">
             <a:avLst/>
@@ -5282,11 +5348,11 @@
           <a:p>
             <a:pPr algn="ctr"/>
             <a:r>
-              <a:rPr lang="en-US" sz="800" b="1" dirty="0" err="1"/>
+              <a:rPr lang="en-US" sz="900" b="1" dirty="0" err="1"/>
               <a:t>OpenTree</a:t>
             </a:r>
             <a:r>
-              <a:rPr lang="en-US" sz="800" b="1" dirty="0"/>
+              <a:rPr lang="en-US" sz="900" b="1" dirty="0"/>
               <a:t> topology</a:t>
             </a:r>
           </a:p>
@@ -5306,7 +5372,7 @@
         </p:nvSpPr>
         <p:spPr>
           <a:xfrm>
-            <a:off x="94968" y="945172"/>
+            <a:off x="94853" y="1002278"/>
             <a:ext cx="1358064" cy="830997"/>
           </a:xfrm>
           <a:prstGeom prst="rect">
@@ -5545,7 +5611,7 @@
         </p:nvSpPr>
         <p:spPr>
           <a:xfrm>
-            <a:off x="4403310" y="2271761"/>
+            <a:off x="4960341" y="2273306"/>
             <a:ext cx="1836341" cy="239937"/>
           </a:xfrm>
           <a:prstGeom prst="rect">
@@ -5767,7 +5833,7 @@
         </p:nvSpPr>
         <p:spPr>
           <a:xfrm rot="5400000" flipV="1">
-            <a:off x="4016737" y="1696428"/>
+            <a:off x="4016737" y="1782011"/>
             <a:ext cx="192024" cy="109728"/>
           </a:xfrm>
           <a:prstGeom prst="rightArrow">
@@ -5829,7 +5895,7 @@
         </p:nvSpPr>
         <p:spPr>
           <a:xfrm rot="5400000" flipV="1">
-            <a:off x="4016737" y="2342088"/>
+            <a:off x="4016737" y="2355340"/>
             <a:ext cx="192024" cy="109728"/>
           </a:xfrm>
           <a:prstGeom prst="rightArrow">
@@ -5877,41 +5943,6 @@
           </a:p>
         </p:txBody>
       </p:sp>
-      <p:pic>
-        <p:nvPicPr>
-          <p:cNvPr id="38" name="Graphic 37">
-            <a:extLst>
-              <a:ext uri="{FF2B5EF4-FFF2-40B4-BE49-F238E27FC236}">
-                <a16:creationId xmlns:a16="http://schemas.microsoft.com/office/drawing/2014/main" id="{AFB2187E-B8E0-BF02-B0EA-55CD4CC7870F}"/>
-              </a:ext>
-            </a:extLst>
-          </p:cNvPr>
-          <p:cNvPicPr>
-            <a:picLocks noChangeAspect="1"/>
-          </p:cNvPicPr>
-          <p:nvPr/>
-        </p:nvPicPr>
-        <p:blipFill rotWithShape="1">
-          <a:blip r:embed="rId2">
-            <a:extLst>
-              <a:ext uri="{96DAC541-7B7A-43D3-8B79-37D633B846F1}">
-                <asvg:svgBlip xmlns:asvg="http://schemas.microsoft.com/office/drawing/2016/SVG/main" r:embed="rId3"/>
-              </a:ext>
-            </a:extLst>
-          </a:blip>
-          <a:srcRect t="84415" b="4995"/>
-          <a:stretch/>
-        </p:blipFill>
-        <p:spPr>
-          <a:xfrm>
-            <a:off x="3779329" y="4126669"/>
-            <a:ext cx="3060240" cy="265031"/>
-          </a:xfrm>
-          <a:prstGeom prst="rect">
-            <a:avLst/>
-          </a:prstGeom>
-        </p:spPr>
-      </p:pic>
       <p:grpSp>
         <p:nvGrpSpPr>
           <p:cNvPr id="31" name="Group 30">
@@ -6200,8 +6231,8 @@
         </p:nvGrpSpPr>
         <p:grpSpPr>
           <a:xfrm>
-            <a:off x="35157" y="24820"/>
-            <a:ext cx="1375964" cy="3638914"/>
+            <a:off x="35157" y="24819"/>
+            <a:ext cx="1375964" cy="4359587"/>
             <a:chOff x="412729" y="5797035"/>
             <a:chExt cx="2538828" cy="1510990"/>
           </a:xfrm>
@@ -6278,7 +6309,7 @@
           <p:spPr>
             <a:xfrm>
               <a:off x="412729" y="5797035"/>
-              <a:ext cx="2527111" cy="160118"/>
+              <a:ext cx="2527111" cy="133650"/>
             </a:xfrm>
             <a:prstGeom prst="roundRect">
               <a:avLst/>
@@ -6469,7 +6500,7 @@
         </p:nvSpPr>
         <p:spPr>
           <a:xfrm>
-            <a:off x="102142" y="2705732"/>
+            <a:off x="-37576" y="3150240"/>
             <a:ext cx="1348446" cy="830997"/>
           </a:xfrm>
           <a:prstGeom prst="rect">

</xml_diff>

<commit_message>
update median chronogram fig of small example (fig 3)
</commit_message>
<xml_diff>
--- a/figures/figure-small-example/figure3-horizontal.pptx
+++ b/figures/figure-small-example/figure3-horizontal.pptx
@@ -243,7 +243,7 @@
           <a:p>
             <a:fld id="{36D6B43A-FB72-2B4A-8DB0-B6C23179BADB}" type="datetimeFigureOut">
               <a:rPr lang="en-US" smtClean="0"/>
-              <a:t>5/20/23</a:t>
+              <a:t>6/6/23</a:t>
             </a:fld>
             <a:endParaRPr lang="en-US"/>
           </a:p>
@@ -413,7 +413,7 @@
           <a:p>
             <a:fld id="{36D6B43A-FB72-2B4A-8DB0-B6C23179BADB}" type="datetimeFigureOut">
               <a:rPr lang="en-US" smtClean="0"/>
-              <a:t>5/20/23</a:t>
+              <a:t>6/6/23</a:t>
             </a:fld>
             <a:endParaRPr lang="en-US"/>
           </a:p>
@@ -593,7 +593,7 @@
           <a:p>
             <a:fld id="{36D6B43A-FB72-2B4A-8DB0-B6C23179BADB}" type="datetimeFigureOut">
               <a:rPr lang="en-US" smtClean="0"/>
-              <a:t>5/20/23</a:t>
+              <a:t>6/6/23</a:t>
             </a:fld>
             <a:endParaRPr lang="en-US"/>
           </a:p>
@@ -763,7 +763,7 @@
           <a:p>
             <a:fld id="{36D6B43A-FB72-2B4A-8DB0-B6C23179BADB}" type="datetimeFigureOut">
               <a:rPr lang="en-US" smtClean="0"/>
-              <a:t>5/20/23</a:t>
+              <a:t>6/6/23</a:t>
             </a:fld>
             <a:endParaRPr lang="en-US"/>
           </a:p>
@@ -1009,7 +1009,7 @@
           <a:p>
             <a:fld id="{36D6B43A-FB72-2B4A-8DB0-B6C23179BADB}" type="datetimeFigureOut">
               <a:rPr lang="en-US" smtClean="0"/>
-              <a:t>5/20/23</a:t>
+              <a:t>6/6/23</a:t>
             </a:fld>
             <a:endParaRPr lang="en-US"/>
           </a:p>
@@ -1241,7 +1241,7 @@
           <a:p>
             <a:fld id="{36D6B43A-FB72-2B4A-8DB0-B6C23179BADB}" type="datetimeFigureOut">
               <a:rPr lang="en-US" smtClean="0"/>
-              <a:t>5/20/23</a:t>
+              <a:t>6/6/23</a:t>
             </a:fld>
             <a:endParaRPr lang="en-US"/>
           </a:p>
@@ -1608,7 +1608,7 @@
           <a:p>
             <a:fld id="{36D6B43A-FB72-2B4A-8DB0-B6C23179BADB}" type="datetimeFigureOut">
               <a:rPr lang="en-US" smtClean="0"/>
-              <a:t>5/20/23</a:t>
+              <a:t>6/6/23</a:t>
             </a:fld>
             <a:endParaRPr lang="en-US"/>
           </a:p>
@@ -1726,7 +1726,7 @@
           <a:p>
             <a:fld id="{36D6B43A-FB72-2B4A-8DB0-B6C23179BADB}" type="datetimeFigureOut">
               <a:rPr lang="en-US" smtClean="0"/>
-              <a:t>5/20/23</a:t>
+              <a:t>6/6/23</a:t>
             </a:fld>
             <a:endParaRPr lang="en-US"/>
           </a:p>
@@ -1821,7 +1821,7 @@
           <a:p>
             <a:fld id="{36D6B43A-FB72-2B4A-8DB0-B6C23179BADB}" type="datetimeFigureOut">
               <a:rPr lang="en-US" smtClean="0"/>
-              <a:t>5/20/23</a:t>
+              <a:t>6/6/23</a:t>
             </a:fld>
             <a:endParaRPr lang="en-US"/>
           </a:p>
@@ -2098,7 +2098,7 @@
           <a:p>
             <a:fld id="{36D6B43A-FB72-2B4A-8DB0-B6C23179BADB}" type="datetimeFigureOut">
               <a:rPr lang="en-US" smtClean="0"/>
-              <a:t>5/20/23</a:t>
+              <a:t>6/6/23</a:t>
             </a:fld>
             <a:endParaRPr lang="en-US"/>
           </a:p>
@@ -2355,7 +2355,7 @@
           <a:p>
             <a:fld id="{36D6B43A-FB72-2B4A-8DB0-B6C23179BADB}" type="datetimeFigureOut">
               <a:rPr lang="en-US" smtClean="0"/>
-              <a:t>5/20/23</a:t>
+              <a:t>6/6/23</a:t>
             </a:fld>
             <a:endParaRPr lang="en-US"/>
           </a:p>
@@ -2568,7 +2568,7 @@
           <a:p>
             <a:fld id="{36D6B43A-FB72-2B4A-8DB0-B6C23179BADB}" type="datetimeFigureOut">
               <a:rPr lang="en-US" smtClean="0"/>
-              <a:t>5/20/23</a:t>
+              <a:t>6/6/23</a:t>
             </a:fld>
             <a:endParaRPr lang="en-US"/>
           </a:p>
@@ -2973,103 +2973,47 @@
           <a:chExt cx="0" cy="0"/>
         </a:xfrm>
       </p:grpSpPr>
-      <p:grpSp>
-        <p:nvGrpSpPr>
-          <p:cNvPr id="13" name="Group 12">
+      <p:pic>
+        <p:nvPicPr>
+          <p:cNvPr id="66" name="Graphic 65">
             <a:extLst>
               <a:ext uri="{FF2B5EF4-FFF2-40B4-BE49-F238E27FC236}">
-                <a16:creationId xmlns:a16="http://schemas.microsoft.com/office/drawing/2014/main" id="{D80BA30C-281F-0763-77E3-620DAD36A0B9}"/>
+                <a16:creationId xmlns:a16="http://schemas.microsoft.com/office/drawing/2014/main" id="{5FDBDBC6-E889-2582-DA29-635CD3933FAF}"/>
               </a:ext>
             </a:extLst>
           </p:cNvPr>
-          <p:cNvGrpSpPr/>
+          <p:cNvPicPr>
+            <a:picLocks noChangeAspect="1"/>
+          </p:cNvPicPr>
           <p:nvPr/>
-        </p:nvGrpSpPr>
-        <p:grpSpPr>
+        </p:nvPicPr>
+        <p:blipFill rotWithShape="1">
+          <a:blip r:embed="rId2">
+            <a:extLst>
+              <a:ext uri="{96DAC541-7B7A-43D3-8B79-37D633B846F1}">
+                <asvg:svgBlip xmlns:asvg="http://schemas.microsoft.com/office/drawing/2016/SVG/main" r:embed="rId3"/>
+              </a:ext>
+            </a:extLst>
+          </a:blip>
+          <a:srcRect t="87001"/>
+          <a:stretch/>
+        </p:blipFill>
+        <p:spPr>
           <a:xfrm>
-            <a:off x="3720524" y="2382558"/>
-            <a:ext cx="3105793" cy="2009142"/>
-            <a:chOff x="3720524" y="2382558"/>
-            <a:chExt cx="3105793" cy="2009142"/>
+            <a:off x="3637330" y="4093601"/>
+            <a:ext cx="3200400" cy="312022"/>
           </a:xfrm>
-        </p:grpSpPr>
-        <p:pic>
-          <p:nvPicPr>
-            <p:cNvPr id="116" name="Graphic 115">
-              <a:extLst>
-                <a:ext uri="{FF2B5EF4-FFF2-40B4-BE49-F238E27FC236}">
-                  <a16:creationId xmlns:a16="http://schemas.microsoft.com/office/drawing/2014/main" id="{6ACC12CA-6D7B-D698-744F-12AFBA5B722C}"/>
-                </a:ext>
-              </a:extLst>
-            </p:cNvPr>
-            <p:cNvPicPr>
-              <a:picLocks noChangeAspect="1"/>
-            </p:cNvPicPr>
-            <p:nvPr/>
-          </p:nvPicPr>
-          <p:blipFill rotWithShape="1">
-            <a:blip r:embed="rId2">
-              <a:extLst>
-                <a:ext uri="{96DAC541-7B7A-43D3-8B79-37D633B846F1}">
-                  <asvg:svgBlip xmlns:asvg="http://schemas.microsoft.com/office/drawing/2016/SVG/main" r:embed="rId3"/>
-                </a:ext>
-              </a:extLst>
-            </a:blip>
-            <a:srcRect t="5404" b="20228"/>
-            <a:stretch/>
-          </p:blipFill>
-          <p:spPr>
-            <a:xfrm>
-              <a:off x="3720524" y="2382558"/>
-              <a:ext cx="3105793" cy="1861201"/>
-            </a:xfrm>
-            <a:prstGeom prst="rect">
-              <a:avLst/>
-            </a:prstGeom>
-          </p:spPr>
-        </p:pic>
-        <p:pic>
-          <p:nvPicPr>
-            <p:cNvPr id="38" name="Graphic 37">
-              <a:extLst>
-                <a:ext uri="{FF2B5EF4-FFF2-40B4-BE49-F238E27FC236}">
-                  <a16:creationId xmlns:a16="http://schemas.microsoft.com/office/drawing/2014/main" id="{AFB2187E-B8E0-BF02-B0EA-55CD4CC7870F}"/>
-                </a:ext>
-              </a:extLst>
-            </p:cNvPr>
-            <p:cNvPicPr>
-              <a:picLocks noChangeAspect="1"/>
-            </p:cNvPicPr>
-            <p:nvPr/>
-          </p:nvPicPr>
-          <p:blipFill rotWithShape="1">
-            <a:blip r:embed="rId2">
-              <a:extLst>
-                <a:ext uri="{96DAC541-7B7A-43D3-8B79-37D633B846F1}">
-                  <asvg:svgBlip xmlns:asvg="http://schemas.microsoft.com/office/drawing/2016/SVG/main" r:embed="rId3"/>
-                </a:ext>
-              </a:extLst>
-            </a:blip>
-            <a:srcRect t="87332" r="31443" b="4995"/>
-            <a:stretch/>
-          </p:blipFill>
-          <p:spPr>
-            <a:xfrm>
-              <a:off x="3746199" y="4199676"/>
-              <a:ext cx="2098010" cy="192024"/>
-            </a:xfrm>
-            <a:prstGeom prst="rect">
-              <a:avLst/>
-            </a:prstGeom>
-          </p:spPr>
-        </p:pic>
-      </p:grpSp>
+          <a:prstGeom prst="rect">
+            <a:avLst/>
+          </a:prstGeom>
+        </p:spPr>
+      </p:pic>
       <p:pic>
         <p:nvPicPr>
-          <p:cNvPr id="110" name="Graphic 109">
+          <p:cNvPr id="96" name="Graphic 95">
             <a:extLst>
               <a:ext uri="{FF2B5EF4-FFF2-40B4-BE49-F238E27FC236}">
-                <a16:creationId xmlns:a16="http://schemas.microsoft.com/office/drawing/2014/main" id="{85A936C8-F772-6EE9-64CE-E6550ED158B5}"/>
+                <a16:creationId xmlns:a16="http://schemas.microsoft.com/office/drawing/2014/main" id="{5506A440-D58C-F84D-DA52-360ECF6065FE}"/>
               </a:ext>
             </a:extLst>
           </p:cNvPr>
@@ -3086,12 +3030,47 @@
               </a:ext>
             </a:extLst>
           </a:blip>
+          <a:srcRect b="22412"/>
+          <a:stretch/>
+        </p:blipFill>
+        <p:spPr>
+          <a:xfrm>
+            <a:off x="3638931" y="2291527"/>
+            <a:ext cx="3200400" cy="1862340"/>
+          </a:xfrm>
+          <a:prstGeom prst="rect">
+            <a:avLst/>
+          </a:prstGeom>
+        </p:spPr>
+      </p:pic>
+      <p:pic>
+        <p:nvPicPr>
+          <p:cNvPr id="110" name="Graphic 109">
+            <a:extLst>
+              <a:ext uri="{FF2B5EF4-FFF2-40B4-BE49-F238E27FC236}">
+                <a16:creationId xmlns:a16="http://schemas.microsoft.com/office/drawing/2014/main" id="{85A936C8-F772-6EE9-64CE-E6550ED158B5}"/>
+              </a:ext>
+            </a:extLst>
+          </p:cNvPr>
+          <p:cNvPicPr>
+            <a:picLocks noChangeAspect="1"/>
+          </p:cNvPicPr>
+          <p:nvPr/>
+        </p:nvPicPr>
+        <p:blipFill rotWithShape="1">
+          <a:blip r:embed="rId6">
+            <a:extLst>
+              <a:ext uri="{96DAC541-7B7A-43D3-8B79-37D633B846F1}">
+                <asvg:svgBlip xmlns:asvg="http://schemas.microsoft.com/office/drawing/2016/SVG/main" r:embed="rId7"/>
+              </a:ext>
+            </a:extLst>
+          </a:blip>
           <a:srcRect t="17682"/>
           <a:stretch/>
         </p:blipFill>
         <p:spPr>
           <a:xfrm>
-            <a:off x="4671914" y="907282"/>
+            <a:off x="4691792" y="841022"/>
             <a:ext cx="2118142" cy="1453020"/>
           </a:xfrm>
           <a:prstGeom prst="rect">
@@ -3115,7 +3094,7 @@
         </p:nvGrpSpPr>
         <p:grpSpPr>
           <a:xfrm>
-            <a:off x="1451826" y="3724549"/>
+            <a:off x="2439559" y="1817385"/>
             <a:ext cx="1114444" cy="675655"/>
             <a:chOff x="-642934" y="6912114"/>
             <a:chExt cx="3881748" cy="2353391"/>
@@ -3187,7 +3166,7 @@
             <p:nvPr/>
           </p:nvPicPr>
           <p:blipFill rotWithShape="1">
-            <a:blip r:embed="rId6"/>
+            <a:blip r:embed="rId8"/>
             <a:srcRect l="-21342" t="74454" r="21342" b="-3777"/>
             <a:stretch/>
           </p:blipFill>
@@ -3216,7 +3195,7 @@
             <p:nvPr/>
           </p:nvPicPr>
           <p:blipFill>
-            <a:blip r:embed="rId7"/>
+            <a:blip r:embed="rId9"/>
             <a:stretch>
               <a:fillRect/>
             </a:stretch>
@@ -3248,7 +3227,7 @@
         </p:nvGrpSpPr>
         <p:grpSpPr>
           <a:xfrm>
-            <a:off x="1429744" y="1026919"/>
+            <a:off x="1423753" y="1126106"/>
             <a:ext cx="1118853" cy="679201"/>
             <a:chOff x="-630085" y="31680"/>
             <a:chExt cx="3906218" cy="2371273"/>
@@ -3340,7 +3319,7 @@
               <p:nvPr/>
             </p:nvPicPr>
             <p:blipFill rotWithShape="1">
-              <a:blip r:embed="rId8"/>
+              <a:blip r:embed="rId10"/>
               <a:srcRect l="-21342" t="74454" r="21342" b="-3777"/>
               <a:stretch/>
             </p:blipFill>
@@ -3370,7 +3349,7 @@
             <p:nvPr/>
           </p:nvPicPr>
           <p:blipFill>
-            <a:blip r:embed="rId9"/>
+            <a:blip r:embed="rId11"/>
             <a:stretch>
               <a:fillRect/>
             </a:stretch>
@@ -3402,7 +3381,7 @@
         </p:nvGrpSpPr>
         <p:grpSpPr>
           <a:xfrm>
-            <a:off x="1391816" y="3017734"/>
+            <a:off x="1338145" y="3070049"/>
             <a:ext cx="1207961" cy="675655"/>
             <a:chOff x="6303322" y="671399"/>
             <a:chExt cx="3885282" cy="2173176"/>
@@ -3497,7 +3476,7 @@
               <p:nvPr/>
             </p:nvPicPr>
             <p:blipFill rotWithShape="1">
-              <a:blip r:embed="rId10"/>
+              <a:blip r:embed="rId12"/>
               <a:srcRect b="30327"/>
               <a:stretch/>
             </p:blipFill>
@@ -3529,7 +3508,7 @@
               <p:nvPr/>
             </p:nvPicPr>
             <p:blipFill rotWithShape="1">
-              <a:blip r:embed="rId11"/>
+              <a:blip r:embed="rId13"/>
               <a:srcRect l="-21342" t="74454" r="21342" b="-3777"/>
               <a:stretch/>
             </p:blipFill>
@@ -3562,7 +3541,7 @@
         </p:nvGrpSpPr>
         <p:grpSpPr>
           <a:xfrm>
-            <a:off x="2447169" y="1172928"/>
+            <a:off x="2399547" y="1124149"/>
             <a:ext cx="1216665" cy="667181"/>
             <a:chOff x="7039380" y="4970127"/>
             <a:chExt cx="3046169" cy="1670423"/>
@@ -3672,7 +3651,7 @@
                 <p:nvPr/>
               </p:nvPicPr>
               <p:blipFill rotWithShape="1">
-                <a:blip r:embed="rId12"/>
+                <a:blip r:embed="rId14"/>
                 <a:srcRect b="30182"/>
                 <a:stretch/>
               </p:blipFill>
@@ -3701,7 +3680,7 @@
                 <p:nvPr/>
               </p:nvPicPr>
               <p:blipFill rotWithShape="1">
-                <a:blip r:embed="rId13"/>
+                <a:blip r:embed="rId15"/>
                 <a:srcRect l="-21342" t="74454" r="21342" b="-3777"/>
                 <a:stretch/>
               </p:blipFill>
@@ -3767,7 +3746,7 @@
         </p:nvGrpSpPr>
         <p:grpSpPr>
           <a:xfrm>
-            <a:off x="2520866" y="1913816"/>
+            <a:off x="1398354" y="1801640"/>
             <a:ext cx="1097623" cy="613626"/>
             <a:chOff x="9722964" y="5069049"/>
             <a:chExt cx="2748123" cy="1536338"/>
@@ -3877,7 +3856,7 @@
                 <p:nvPr/>
               </p:nvPicPr>
               <p:blipFill rotWithShape="1">
-                <a:blip r:embed="rId14"/>
+                <a:blip r:embed="rId16"/>
                 <a:srcRect b="30182"/>
                 <a:stretch/>
               </p:blipFill>
@@ -3906,7 +3885,7 @@
                 <p:nvPr/>
               </p:nvPicPr>
               <p:blipFill rotWithShape="1">
-                <a:blip r:embed="rId15"/>
+                <a:blip r:embed="rId17"/>
                 <a:srcRect l="-21342" t="74454" r="21342" b="-3777"/>
                 <a:stretch/>
               </p:blipFill>
@@ -3972,7 +3951,7 @@
         </p:nvGrpSpPr>
         <p:grpSpPr>
           <a:xfrm>
-            <a:off x="1397647" y="2330228"/>
+            <a:off x="2414406" y="2459288"/>
             <a:ext cx="1183046" cy="661645"/>
             <a:chOff x="12064664" y="1579761"/>
             <a:chExt cx="2961997" cy="1656564"/>
@@ -4064,7 +4043,7 @@
               <p:nvPr/>
             </p:nvPicPr>
             <p:blipFill rotWithShape="1">
-              <a:blip r:embed="rId16"/>
+              <a:blip r:embed="rId18"/>
               <a:srcRect b="30890"/>
               <a:stretch/>
             </p:blipFill>
@@ -4093,7 +4072,7 @@
               <p:nvPr/>
             </p:nvPicPr>
             <p:blipFill rotWithShape="1">
-              <a:blip r:embed="rId17"/>
+              <a:blip r:embed="rId19"/>
               <a:srcRect l="-21342" t="74454" r="21342" b="-3777"/>
               <a:stretch/>
             </p:blipFill>
@@ -4158,7 +4137,7 @@
         </p:nvGrpSpPr>
         <p:grpSpPr>
           <a:xfrm>
-            <a:off x="2524606" y="3288535"/>
+            <a:off x="1839117" y="3760608"/>
             <a:ext cx="1090136" cy="606266"/>
             <a:chOff x="12263291" y="5079733"/>
             <a:chExt cx="2729378" cy="1517910"/>
@@ -4248,7 +4227,7 @@
               <p:nvPr/>
             </p:nvPicPr>
             <p:blipFill rotWithShape="1">
-              <a:blip r:embed="rId18"/>
+              <a:blip r:embed="rId20"/>
               <a:srcRect b="32065"/>
               <a:stretch/>
             </p:blipFill>
@@ -4277,7 +4256,7 @@
               <p:nvPr/>
             </p:nvPicPr>
             <p:blipFill rotWithShape="1">
-              <a:blip r:embed="rId19"/>
+              <a:blip r:embed="rId21"/>
               <a:srcRect l="-21342" t="74454" r="21342" b="-3777"/>
               <a:stretch/>
             </p:blipFill>
@@ -4342,7 +4321,7 @@
         </p:nvGrpSpPr>
         <p:grpSpPr>
           <a:xfrm>
-            <a:off x="1438295" y="1683311"/>
+            <a:off x="1400389" y="2437336"/>
             <a:ext cx="1087575" cy="608408"/>
             <a:chOff x="9656734" y="1647008"/>
             <a:chExt cx="2722964" cy="1523273"/>
@@ -4454,7 +4433,7 @@
                 <p:nvPr/>
               </p:nvPicPr>
               <p:blipFill rotWithShape="1">
-                <a:blip r:embed="rId20"/>
+                <a:blip r:embed="rId22"/>
                 <a:srcRect b="30157"/>
                 <a:stretch/>
               </p:blipFill>
@@ -4483,7 +4462,7 @@
                 <p:nvPr/>
               </p:nvPicPr>
               <p:blipFill rotWithShape="1">
-                <a:blip r:embed="rId21"/>
+                <a:blip r:embed="rId23"/>
                 <a:srcRect l="-21342" t="74454" r="21342" b="-3777"/>
                 <a:stretch/>
               </p:blipFill>
@@ -4549,7 +4528,7 @@
         </p:nvGrpSpPr>
         <p:grpSpPr>
           <a:xfrm>
-            <a:off x="2523866" y="2601154"/>
+            <a:off x="2458174" y="3140357"/>
             <a:ext cx="1091616" cy="613675"/>
             <a:chOff x="12301284" y="3375068"/>
             <a:chExt cx="2733084" cy="1536459"/>
@@ -4659,7 +4638,7 @@
                 <p:nvPr/>
               </p:nvPicPr>
               <p:blipFill rotWithShape="1">
-                <a:blip r:embed="rId22"/>
+                <a:blip r:embed="rId24"/>
                 <a:srcRect b="30542"/>
                 <a:stretch/>
               </p:blipFill>
@@ -4688,7 +4667,7 @@
                 <p:nvPr/>
               </p:nvPicPr>
               <p:blipFill rotWithShape="1">
-                <a:blip r:embed="rId23"/>
+                <a:blip r:embed="rId25"/>
                 <a:srcRect l="-21342" t="74454" r="21342" b="-3777"/>
                 <a:stretch/>
               </p:blipFill>
@@ -4794,7 +4773,7 @@
         <p:spPr>
           <a:xfrm>
             <a:off x="22273" y="2170014"/>
-            <a:ext cx="1402435" cy="738664"/>
+            <a:ext cx="1402435" cy="846386"/>
           </a:xfrm>
           <a:prstGeom prst="rect">
             <a:avLst/>
@@ -4837,7 +4816,13 @@
             </a:r>
             <a:r>
               <a:rPr lang="en-US" sz="700" dirty="0"/>
-              <a:t> taxonomy v3.3draft1. One species  name  (bold) is a synonym in the standardized taxonomy.</a:t>
+              <a:t> Taxonomy v3.3draft1. </a:t>
+            </a:r>
+          </a:p>
+          <a:p>
+            <a:r>
+              <a:rPr lang="en-US" sz="700" dirty="0"/>
+              <a:t>One species  name  (shown in bold) is a synonym in the standardized taxonomy.</a:t>
             </a:r>
             <a:endParaRPr lang="en-US" sz="700" i="1" dirty="0"/>
           </a:p>
@@ -4919,8 +4904,8 @@
         </p:nvSpPr>
         <p:spPr>
           <a:xfrm>
-            <a:off x="3786383" y="394293"/>
-            <a:ext cx="3071617" cy="200055"/>
+            <a:off x="3802726" y="394293"/>
+            <a:ext cx="3055274" cy="200055"/>
           </a:xfrm>
           <a:prstGeom prst="rect">
             <a:avLst/>
@@ -4974,8 +4959,8 @@
         </p:nvSpPr>
         <p:spPr>
           <a:xfrm>
-            <a:off x="3763926" y="701076"/>
-            <a:ext cx="1278526" cy="523220"/>
+            <a:off x="3803170" y="787214"/>
+            <a:ext cx="1441561" cy="523220"/>
           </a:xfrm>
           <a:prstGeom prst="rect">
             <a:avLst/>
@@ -5006,13 +4991,33 @@
             </a:r>
             <a:r>
               <a:rPr lang="en-US" sz="700" dirty="0"/>
-              <a:t>source chronogram nodes to nodes of tree topology. </a:t>
+              <a:t>source </a:t>
             </a:r>
           </a:p>
           <a:p>
             <a:r>
               <a:rPr lang="en-US" sz="700" dirty="0"/>
-              <a:t>See Table 1.</a:t>
+              <a:t>       chronogram nodes to nodes </a:t>
+            </a:r>
+          </a:p>
+          <a:p>
+            <a:r>
+              <a:rPr lang="en-US" sz="700" dirty="0"/>
+              <a:t>       of the </a:t>
+            </a:r>
+            <a:r>
+              <a:rPr lang="en-US" sz="700" dirty="0" err="1"/>
+              <a:t>OpenTree</a:t>
+            </a:r>
+            <a:r>
+              <a:rPr lang="en-US" sz="700" dirty="0"/>
+              <a:t> topology. </a:t>
+            </a:r>
+          </a:p>
+          <a:p>
+            <a:r>
+              <a:rPr lang="en-US" sz="700" dirty="0"/>
+              <a:t>       See Table 1.</a:t>
             </a:r>
           </a:p>
         </p:txBody>
@@ -5031,8 +5036,8 @@
         </p:nvSpPr>
         <p:spPr>
           <a:xfrm>
-            <a:off x="1516959" y="386450"/>
-            <a:ext cx="1068596" cy="630942"/>
+            <a:off x="1516958" y="386450"/>
+            <a:ext cx="2208020" cy="307777"/>
           </a:xfrm>
           <a:prstGeom prst="rect">
             <a:avLst/>
@@ -5051,7 +5056,13 @@
             </a:r>
             <a:r>
               <a:rPr lang="en-US" sz="700" dirty="0"/>
-              <a:t> Searched processed taxon names across 253 chronograms in </a:t>
+              <a:t> Searched processed taxon names across 253 </a:t>
+            </a:r>
+          </a:p>
+          <a:p>
+            <a:r>
+              <a:rPr lang="en-US" sz="700" dirty="0"/>
+              <a:t>       chronograms in </a:t>
             </a:r>
             <a:r>
               <a:rPr lang="en-US" sz="700" b="1" dirty="0" err="1"/>
@@ -5078,7 +5089,7 @@
         </p:nvGrpSpPr>
         <p:grpSpPr>
           <a:xfrm>
-            <a:off x="4984139" y="619504"/>
+            <a:off x="4898001" y="573122"/>
             <a:ext cx="519451" cy="310176"/>
             <a:chOff x="8180912" y="11275546"/>
             <a:chExt cx="2375842" cy="1418668"/>
@@ -5153,7 +5164,7 @@
             <p:nvPr/>
           </p:nvPicPr>
           <p:blipFill>
-            <a:blip r:embed="rId24"/>
+            <a:blip r:embed="rId26"/>
             <a:stretch>
               <a:fillRect/>
             </a:stretch>
@@ -5183,8 +5194,8 @@
         </p:nvSpPr>
         <p:spPr>
           <a:xfrm>
-            <a:off x="2674309" y="392675"/>
-            <a:ext cx="1039269" cy="523220"/>
+            <a:off x="1524351" y="818410"/>
+            <a:ext cx="2193234" cy="307777"/>
           </a:xfrm>
           <a:prstGeom prst="rect">
             <a:avLst/>
@@ -5211,7 +5222,13 @@
             </a:r>
             <a:r>
               <a:rPr lang="en-US" sz="700" dirty="0"/>
-              <a:t>from 6 independent, published studies:</a:t>
+              <a:t>from 6 </a:t>
+            </a:r>
+          </a:p>
+          <a:p>
+            <a:r>
+              <a:rPr lang="en-US" sz="700" dirty="0"/>
+              <a:t>       independent, published studies:</a:t>
             </a:r>
           </a:p>
         </p:txBody>
@@ -5230,8 +5247,8 @@
         </p:nvSpPr>
         <p:spPr>
           <a:xfrm>
-            <a:off x="3746199" y="1923415"/>
-            <a:ext cx="1426872" cy="415498"/>
+            <a:off x="3795120" y="1938136"/>
+            <a:ext cx="1559850" cy="415498"/>
           </a:xfrm>
           <a:prstGeom prst="rect">
             <a:avLst/>
@@ -5250,11 +5267,23 @@
             </a:r>
             <a:r>
               <a:rPr lang="en-US" sz="700" dirty="0"/>
-              <a:t> Used summarized ages of congruent nodes to </a:t>
+              <a:t> Used summarized ages of </a:t>
+            </a:r>
+          </a:p>
+          <a:p>
+            <a:r>
+              <a:rPr lang="en-US" sz="700" dirty="0"/>
+              <a:t>      congruent nodes to </a:t>
             </a:r>
             <a:r>
               <a:rPr lang="en-US" sz="700" b="1" dirty="0"/>
-              <a:t>date the chosen tree topology </a:t>
+              <a:t>date the </a:t>
+            </a:r>
+          </a:p>
+          <a:p>
+            <a:r>
+              <a:rPr lang="en-US" sz="700" b="1" dirty="0"/>
+              <a:t>      chosen tree topology </a:t>
             </a:r>
             <a:r>
               <a:rPr lang="en-US" sz="700" dirty="0"/>
@@ -5281,8 +5310,8 @@
         </p:nvSpPr>
         <p:spPr>
           <a:xfrm>
-            <a:off x="3734085" y="1354976"/>
-            <a:ext cx="1101007" cy="415498"/>
+            <a:off x="3812887" y="1374449"/>
+            <a:ext cx="1055516" cy="415498"/>
           </a:xfrm>
           <a:prstGeom prst="rect">
             <a:avLst/>
@@ -5307,13 +5336,25 @@
               <a:rPr lang="en-US" sz="700" b="1" dirty="0"/>
               <a:t>Get summarized </a:t>
             </a:r>
+          </a:p>
+          <a:p>
+            <a:r>
+              <a:rPr lang="en-US" sz="700" b="1" dirty="0"/>
+              <a:t>      </a:t>
+            </a:r>
             <a:r>
               <a:rPr lang="en-US" sz="700" b="1" dirty="0" err="1"/>
               <a:t>congruified</a:t>
             </a:r>
             <a:r>
               <a:rPr lang="en-US" sz="700" dirty="0"/>
-              <a:t> ages per node. See Table 2.</a:t>
+              <a:t> ages per </a:t>
+            </a:r>
+          </a:p>
+          <a:p>
+            <a:r>
+              <a:rPr lang="en-US" sz="700" dirty="0"/>
+              <a:t>      node. See Table 2.</a:t>
             </a:r>
           </a:p>
         </p:txBody>
@@ -5332,7 +5373,7 @@
         </p:nvSpPr>
         <p:spPr>
           <a:xfrm>
-            <a:off x="5042452" y="641639"/>
+            <a:off x="5108583" y="582148"/>
             <a:ext cx="2043944" cy="230832"/>
           </a:xfrm>
           <a:prstGeom prst="rect">
@@ -5611,8 +5652,8 @@
         </p:nvSpPr>
         <p:spPr>
           <a:xfrm>
-            <a:off x="4960341" y="2273306"/>
-            <a:ext cx="1836341" cy="239937"/>
+            <a:off x="5416402" y="2046772"/>
+            <a:ext cx="1523829" cy="387542"/>
           </a:xfrm>
           <a:prstGeom prst="rect">
             <a:avLst/>
@@ -5646,8 +5687,8 @@
           <p:nvPr/>
         </p:nvSpPr>
         <p:spPr>
-          <a:xfrm flipV="1">
-            <a:off x="2522113" y="454882"/>
+          <a:xfrm rot="5400000" flipV="1">
+            <a:off x="1577709" y="667715"/>
             <a:ext cx="190833" cy="111591"/>
           </a:xfrm>
           <a:prstGeom prst="rightArrow">
@@ -5709,7 +5750,7 @@
         </p:nvSpPr>
         <p:spPr>
           <a:xfrm rot="5400000" flipV="1">
-            <a:off x="4016737" y="596115"/>
+            <a:off x="3850026" y="635832"/>
             <a:ext cx="192024" cy="109728"/>
           </a:xfrm>
           <a:prstGeom prst="rightArrow">
@@ -5771,8 +5812,8 @@
         </p:nvSpPr>
         <p:spPr>
           <a:xfrm rot="5400000" flipV="1">
-            <a:off x="4016737" y="1236996"/>
-            <a:ext cx="192024" cy="109728"/>
+            <a:off x="3763960" y="1143465"/>
+            <a:ext cx="369541" cy="115114"/>
           </a:xfrm>
           <a:prstGeom prst="rightArrow">
             <a:avLst/>
@@ -5833,8 +5874,8 @@
         </p:nvSpPr>
         <p:spPr>
           <a:xfrm rot="5400000" flipV="1">
-            <a:off x="4016737" y="1782011"/>
-            <a:ext cx="192024" cy="109728"/>
+            <a:off x="3805459" y="1695110"/>
+            <a:ext cx="320392" cy="115115"/>
           </a:xfrm>
           <a:prstGeom prst="rightArrow">
             <a:avLst/>
@@ -5894,9 +5935,9 @@
           <p:nvPr/>
         </p:nvSpPr>
         <p:spPr>
-          <a:xfrm rot="5400000" flipV="1">
-            <a:off x="4016737" y="2355340"/>
-            <a:ext cx="192024" cy="109728"/>
+          <a:xfrm flipV="1">
+            <a:off x="5270311" y="2173048"/>
+            <a:ext cx="355721" cy="126269"/>
           </a:xfrm>
           <a:prstGeom prst="rightArrow">
             <a:avLst/>

</xml_diff>